<commit_message>
parse_hscan with latest vogdb
</commit_message>
<xml_diff>
--- a/vogdb/figures/tigr_Nsigma_HostPhylum.pptx
+++ b/vogdb/figures/tigr_Nsigma_HostPhylum.pptx
@@ -2332,8 +2332,138 @@
           </p:nvSpPr>
           <p:spPr>
             <a:xfrm>
-              <a:off x="1874423" y="1088740"/>
-              <a:ext cx="904170" cy="119325"/>
+              <a:off x="1567651" y="1088740"/>
+              <a:ext cx="1210942" cy="119325"/>
+            </a:xfrm>
+            <a:prstGeom prst="rect">
+              <a:avLst/>
+            </a:prstGeom>
+            <a:solidFill>
+              <a:srgbClr val="7AD151">
+                <a:alpha val="100000"/>
+              </a:srgbClr>
+            </a:solidFill>
+          </p:spPr>
+          <p:txBody>
+            <a:bodyPr/>
+            <a:lstStyle/>
+            <a:p/>
+          </p:txBody>
+        </p:sp>
+        <p:sp>
+          <p:nvSpPr>
+            <p:cNvPr id="7" name="rc7"/>
+            <p:cNvSpPr/>
+            <p:nvPr/>
+          </p:nvSpPr>
+          <p:spPr>
+            <a:xfrm>
+              <a:off x="841086" y="1088740"/>
+              <a:ext cx="726565" cy="119325"/>
+            </a:xfrm>
+            <a:prstGeom prst="rect">
+              <a:avLst/>
+            </a:prstGeom>
+            <a:solidFill>
+              <a:srgbClr val="2A788E">
+                <a:alpha val="100000"/>
+              </a:srgbClr>
+            </a:solidFill>
+          </p:spPr>
+          <p:txBody>
+            <a:bodyPr/>
+            <a:lstStyle/>
+            <a:p/>
+          </p:txBody>
+        </p:sp>
+        <p:sp>
+          <p:nvSpPr>
+            <p:cNvPr id="8" name="rc8"/>
+            <p:cNvSpPr/>
+            <p:nvPr/>
+          </p:nvSpPr>
+          <p:spPr>
+            <a:xfrm>
+              <a:off x="841086" y="850089"/>
+              <a:ext cx="1937507" cy="119325"/>
+            </a:xfrm>
+            <a:prstGeom prst="rect">
+              <a:avLst/>
+            </a:prstGeom>
+            <a:solidFill>
+              <a:srgbClr val="7AD151">
+                <a:alpha val="100000"/>
+              </a:srgbClr>
+            </a:solidFill>
+          </p:spPr>
+          <p:txBody>
+            <a:bodyPr/>
+            <a:lstStyle/>
+            <a:p/>
+          </p:txBody>
+        </p:sp>
+        <p:sp>
+          <p:nvSpPr>
+            <p:cNvPr id="9" name="rc9"/>
+            <p:cNvSpPr/>
+            <p:nvPr/>
+          </p:nvSpPr>
+          <p:spPr>
+            <a:xfrm>
+              <a:off x="869579" y="611439"/>
+              <a:ext cx="1909015" cy="119325"/>
+            </a:xfrm>
+            <a:prstGeom prst="rect">
+              <a:avLst/>
+            </a:prstGeom>
+            <a:solidFill>
+              <a:srgbClr val="7AD151">
+                <a:alpha val="100000"/>
+              </a:srgbClr>
+            </a:solidFill>
+          </p:spPr>
+          <p:txBody>
+            <a:bodyPr/>
+            <a:lstStyle/>
+            <a:p/>
+          </p:txBody>
+        </p:sp>
+        <p:sp>
+          <p:nvSpPr>
+            <p:cNvPr id="10" name="rc10"/>
+            <p:cNvSpPr/>
+            <p:nvPr/>
+          </p:nvSpPr>
+          <p:spPr>
+            <a:xfrm>
+              <a:off x="841086" y="611439"/>
+              <a:ext cx="28492" cy="119325"/>
+            </a:xfrm>
+            <a:prstGeom prst="rect">
+              <a:avLst/>
+            </a:prstGeom>
+            <a:solidFill>
+              <a:srgbClr val="2A788E">
+                <a:alpha val="100000"/>
+              </a:srgbClr>
+            </a:solidFill>
+          </p:spPr>
+          <p:txBody>
+            <a:bodyPr/>
+            <a:lstStyle/>
+            <a:p/>
+          </p:txBody>
+        </p:sp>
+        <p:sp>
+          <p:nvSpPr>
+            <p:cNvPr id="11" name="rc11"/>
+            <p:cNvSpPr/>
+            <p:nvPr/>
+          </p:nvSpPr>
+          <p:spPr>
+            <a:xfrm>
+              <a:off x="2032862" y="372788"/>
+              <a:ext cx="745731" cy="119325"/>
             </a:xfrm>
             <a:prstGeom prst="rect">
               <a:avLst/>
@@ -2352,14 +2482,14 @@
         </p:sp>
         <p:sp>
           <p:nvSpPr>
-            <p:cNvPr id="7" name="rc7"/>
-            <p:cNvSpPr/>
-            <p:nvPr/>
-          </p:nvSpPr>
-          <p:spPr>
-            <a:xfrm>
-              <a:off x="1228587" y="1088740"/>
-              <a:ext cx="645835" cy="119325"/>
+            <p:cNvPr id="12" name="rc12"/>
+            <p:cNvSpPr/>
+            <p:nvPr/>
+          </p:nvSpPr>
+          <p:spPr>
+            <a:xfrm>
+              <a:off x="1489245" y="372788"/>
+              <a:ext cx="543617" cy="119325"/>
             </a:xfrm>
             <a:prstGeom prst="rect">
               <a:avLst/>
@@ -2378,14 +2508,40 @@
         </p:sp>
         <p:sp>
           <p:nvSpPr>
-            <p:cNvPr id="8" name="rc8"/>
-            <p:cNvSpPr/>
-            <p:nvPr/>
-          </p:nvSpPr>
-          <p:spPr>
-            <a:xfrm>
-              <a:off x="841086" y="1088740"/>
-              <a:ext cx="387501" cy="119325"/>
+            <p:cNvPr id="13" name="rc13"/>
+            <p:cNvSpPr/>
+            <p:nvPr/>
+          </p:nvSpPr>
+          <p:spPr>
+            <a:xfrm>
+              <a:off x="1468337" y="372788"/>
+              <a:ext cx="20908" cy="119325"/>
+            </a:xfrm>
+            <a:prstGeom prst="rect">
+              <a:avLst/>
+            </a:prstGeom>
+            <a:solidFill>
+              <a:srgbClr val="22A884">
+                <a:alpha val="100000"/>
+              </a:srgbClr>
+            </a:solidFill>
+          </p:spPr>
+          <p:txBody>
+            <a:bodyPr/>
+            <a:lstStyle/>
+            <a:p/>
+          </p:txBody>
+        </p:sp>
+        <p:sp>
+          <p:nvSpPr>
+            <p:cNvPr id="14" name="rc14"/>
+            <p:cNvSpPr/>
+            <p:nvPr/>
+          </p:nvSpPr>
+          <p:spPr>
+            <a:xfrm>
+              <a:off x="1440459" y="372788"/>
+              <a:ext cx="27877" cy="119325"/>
             </a:xfrm>
             <a:prstGeom prst="rect">
               <a:avLst/>
@@ -2404,14 +2560,92 @@
         </p:sp>
         <p:sp>
           <p:nvSpPr>
-            <p:cNvPr id="9" name="rc9"/>
-            <p:cNvSpPr/>
-            <p:nvPr/>
-          </p:nvSpPr>
-          <p:spPr>
-            <a:xfrm>
-              <a:off x="841086" y="850089"/>
-              <a:ext cx="1937507" cy="119325"/>
+            <p:cNvPr id="15" name="rc15"/>
+            <p:cNvSpPr/>
+            <p:nvPr/>
+          </p:nvSpPr>
+          <p:spPr>
+            <a:xfrm>
+              <a:off x="1419551" y="372788"/>
+              <a:ext cx="20908" cy="119325"/>
+            </a:xfrm>
+            <a:prstGeom prst="rect">
+              <a:avLst/>
+            </a:prstGeom>
+            <a:solidFill>
+              <a:srgbClr val="414487">
+                <a:alpha val="100000"/>
+              </a:srgbClr>
+            </a:solidFill>
+          </p:spPr>
+          <p:txBody>
+            <a:bodyPr/>
+            <a:lstStyle/>
+            <a:p/>
+          </p:txBody>
+        </p:sp>
+        <p:sp>
+          <p:nvSpPr>
+            <p:cNvPr id="16" name="rc16"/>
+            <p:cNvSpPr/>
+            <p:nvPr/>
+          </p:nvSpPr>
+          <p:spPr>
+            <a:xfrm>
+              <a:off x="841086" y="372788"/>
+              <a:ext cx="578464" cy="119325"/>
+            </a:xfrm>
+            <a:prstGeom prst="rect">
+              <a:avLst/>
+            </a:prstGeom>
+            <a:solidFill>
+              <a:srgbClr val="440154">
+                <a:alpha val="100000"/>
+              </a:srgbClr>
+            </a:solidFill>
+          </p:spPr>
+          <p:txBody>
+            <a:bodyPr/>
+            <a:lstStyle/>
+            <a:p/>
+          </p:txBody>
+        </p:sp>
+        <p:sp>
+          <p:nvSpPr>
+            <p:cNvPr id="17" name="rc17"/>
+            <p:cNvSpPr/>
+            <p:nvPr/>
+          </p:nvSpPr>
+          <p:spPr>
+            <a:xfrm>
+              <a:off x="1311464" y="134137"/>
+              <a:ext cx="1467130" cy="119325"/>
+            </a:xfrm>
+            <a:prstGeom prst="rect">
+              <a:avLst/>
+            </a:prstGeom>
+            <a:solidFill>
+              <a:srgbClr val="FDE725">
+                <a:alpha val="100000"/>
+              </a:srgbClr>
+            </a:solidFill>
+          </p:spPr>
+          <p:txBody>
+            <a:bodyPr/>
+            <a:lstStyle/>
+            <a:p/>
+          </p:txBody>
+        </p:sp>
+        <p:sp>
+          <p:nvSpPr>
+            <p:cNvPr id="18" name="rc18"/>
+            <p:cNvSpPr/>
+            <p:nvPr/>
+          </p:nvSpPr>
+          <p:spPr>
+            <a:xfrm>
+              <a:off x="841086" y="134137"/>
+              <a:ext cx="470377" cy="119325"/>
             </a:xfrm>
             <a:prstGeom prst="rect">
               <a:avLst/>
@@ -2430,267 +2664,7 @@
         </p:sp>
         <p:sp>
           <p:nvSpPr>
-            <p:cNvPr id="10" name="rc10"/>
-            <p:cNvSpPr/>
-            <p:nvPr/>
-          </p:nvSpPr>
-          <p:spPr>
-            <a:xfrm>
-              <a:off x="896443" y="611439"/>
-              <a:ext cx="1882150" cy="119325"/>
-            </a:xfrm>
-            <a:prstGeom prst="rect">
-              <a:avLst/>
-            </a:prstGeom>
-            <a:solidFill>
-              <a:srgbClr val="7AD151">
-                <a:alpha val="100000"/>
-              </a:srgbClr>
-            </a:solidFill>
-          </p:spPr>
-          <p:txBody>
-            <a:bodyPr/>
-            <a:lstStyle/>
-            <a:p/>
-          </p:txBody>
-        </p:sp>
-        <p:sp>
-          <p:nvSpPr>
-            <p:cNvPr id="11" name="rc11"/>
-            <p:cNvSpPr/>
-            <p:nvPr/>
-          </p:nvSpPr>
-          <p:spPr>
-            <a:xfrm>
-              <a:off x="841086" y="611439"/>
-              <a:ext cx="55357" cy="119325"/>
-            </a:xfrm>
-            <a:prstGeom prst="rect">
-              <a:avLst/>
-            </a:prstGeom>
-            <a:solidFill>
-              <a:srgbClr val="2A788E">
-                <a:alpha val="100000"/>
-              </a:srgbClr>
-            </a:solidFill>
-          </p:spPr>
-          <p:txBody>
-            <a:bodyPr/>
-            <a:lstStyle/>
-            <a:p/>
-          </p:txBody>
-        </p:sp>
-        <p:sp>
-          <p:nvSpPr>
-            <p:cNvPr id="12" name="rc12"/>
-            <p:cNvSpPr/>
-            <p:nvPr/>
-          </p:nvSpPr>
-          <p:spPr>
-            <a:xfrm>
-              <a:off x="2057459" y="372788"/>
-              <a:ext cx="721135" cy="119325"/>
-            </a:xfrm>
-            <a:prstGeom prst="rect">
-              <a:avLst/>
-            </a:prstGeom>
-            <a:solidFill>
-              <a:srgbClr val="FDE725">
-                <a:alpha val="100000"/>
-              </a:srgbClr>
-            </a:solidFill>
-          </p:spPr>
-          <p:txBody>
-            <a:bodyPr/>
-            <a:lstStyle/>
-            <a:p/>
-          </p:txBody>
-        </p:sp>
-        <p:sp>
-          <p:nvSpPr>
-            <p:cNvPr id="13" name="rc13"/>
-            <p:cNvSpPr/>
-            <p:nvPr/>
-          </p:nvSpPr>
-          <p:spPr>
-            <a:xfrm>
-              <a:off x="1588286" y="372788"/>
-              <a:ext cx="469172" cy="119325"/>
-            </a:xfrm>
-            <a:prstGeom prst="rect">
-              <a:avLst/>
-            </a:prstGeom>
-            <a:solidFill>
-              <a:srgbClr val="7AD151">
-                <a:alpha val="100000"/>
-              </a:srgbClr>
-            </a:solidFill>
-          </p:spPr>
-          <p:txBody>
-            <a:bodyPr/>
-            <a:lstStyle/>
-            <a:p/>
-          </p:txBody>
-        </p:sp>
-        <p:sp>
-          <p:nvSpPr>
-            <p:cNvPr id="14" name="rc14"/>
-            <p:cNvSpPr/>
-            <p:nvPr/>
-          </p:nvSpPr>
-          <p:spPr>
-            <a:xfrm>
-              <a:off x="1562221" y="372788"/>
-              <a:ext cx="26065" cy="119325"/>
-            </a:xfrm>
-            <a:prstGeom prst="rect">
-              <a:avLst/>
-            </a:prstGeom>
-            <a:solidFill>
-              <a:srgbClr val="22A884">
-                <a:alpha val="100000"/>
-              </a:srgbClr>
-            </a:solidFill>
-          </p:spPr>
-          <p:txBody>
-            <a:bodyPr/>
-            <a:lstStyle/>
-            <a:p/>
-          </p:txBody>
-        </p:sp>
-        <p:sp>
-          <p:nvSpPr>
-            <p:cNvPr id="15" name="rc15"/>
-            <p:cNvSpPr/>
-            <p:nvPr/>
-          </p:nvSpPr>
-          <p:spPr>
-            <a:xfrm>
-              <a:off x="1527468" y="372788"/>
-              <a:ext cx="34753" cy="119325"/>
-            </a:xfrm>
-            <a:prstGeom prst="rect">
-              <a:avLst/>
-            </a:prstGeom>
-            <a:solidFill>
-              <a:srgbClr val="2A788E">
-                <a:alpha val="100000"/>
-              </a:srgbClr>
-            </a:solidFill>
-          </p:spPr>
-          <p:txBody>
-            <a:bodyPr/>
-            <a:lstStyle/>
-            <a:p/>
-          </p:txBody>
-        </p:sp>
-        <p:sp>
-          <p:nvSpPr>
-            <p:cNvPr id="16" name="rc16"/>
-            <p:cNvSpPr/>
-            <p:nvPr/>
-          </p:nvSpPr>
-          <p:spPr>
-            <a:xfrm>
-              <a:off x="1501403" y="372788"/>
-              <a:ext cx="26065" cy="119325"/>
-            </a:xfrm>
-            <a:prstGeom prst="rect">
-              <a:avLst/>
-            </a:prstGeom>
-            <a:solidFill>
-              <a:srgbClr val="414487">
-                <a:alpha val="100000"/>
-              </a:srgbClr>
-            </a:solidFill>
-          </p:spPr>
-          <p:txBody>
-            <a:bodyPr/>
-            <a:lstStyle/>
-            <a:p/>
-          </p:txBody>
-        </p:sp>
-        <p:sp>
-          <p:nvSpPr>
-            <p:cNvPr id="17" name="rc17"/>
-            <p:cNvSpPr/>
-            <p:nvPr/>
-          </p:nvSpPr>
-          <p:spPr>
-            <a:xfrm>
-              <a:off x="841086" y="372788"/>
-              <a:ext cx="660316" cy="119325"/>
-            </a:xfrm>
-            <a:prstGeom prst="rect">
-              <a:avLst/>
-            </a:prstGeom>
-            <a:solidFill>
-              <a:srgbClr val="440154">
-                <a:alpha val="100000"/>
-              </a:srgbClr>
-            </a:solidFill>
-          </p:spPr>
-          <p:txBody>
-            <a:bodyPr/>
-            <a:lstStyle/>
-            <a:p/>
-          </p:txBody>
-        </p:sp>
-        <p:sp>
-          <p:nvSpPr>
-            <p:cNvPr id="18" name="rc18"/>
-            <p:cNvSpPr/>
-            <p:nvPr/>
-          </p:nvSpPr>
-          <p:spPr>
-            <a:xfrm>
-              <a:off x="1447025" y="134137"/>
-              <a:ext cx="1331569" cy="119325"/>
-            </a:xfrm>
-            <a:prstGeom prst="rect">
-              <a:avLst/>
-            </a:prstGeom>
-            <a:solidFill>
-              <a:srgbClr val="FDE725">
-                <a:alpha val="100000"/>
-              </a:srgbClr>
-            </a:solidFill>
-          </p:spPr>
-          <p:txBody>
-            <a:bodyPr/>
-            <a:lstStyle/>
-            <a:p/>
-          </p:txBody>
-        </p:sp>
-        <p:sp>
-          <p:nvSpPr>
             <p:cNvPr id="19" name="rc19"/>
-            <p:cNvSpPr/>
-            <p:nvPr/>
-          </p:nvSpPr>
-          <p:spPr>
-            <a:xfrm>
-              <a:off x="841086" y="134137"/>
-              <a:ext cx="605938" cy="119325"/>
-            </a:xfrm>
-            <a:prstGeom prst="rect">
-              <a:avLst/>
-            </a:prstGeom>
-            <a:solidFill>
-              <a:srgbClr val="7AD151">
-                <a:alpha val="100000"/>
-              </a:srgbClr>
-            </a:solidFill>
-          </p:spPr>
-          <p:txBody>
-            <a:bodyPr/>
-            <a:lstStyle/>
-            <a:p/>
-          </p:txBody>
-        </p:sp>
-        <p:sp>
-          <p:nvSpPr>
-            <p:cNvPr id="20" name="rc20"/>
             <p:cNvSpPr/>
             <p:nvPr/>
           </p:nvSpPr>
@@ -2720,7 +2694,7 @@
         </p:sp>
         <p:sp>
           <p:nvSpPr>
-            <p:cNvPr id="21" name="pl21"/>
+            <p:cNvPr id="20" name="pl20"/>
             <p:cNvSpPr/>
             <p:nvPr/>
           </p:nvSpPr>
@@ -2760,7 +2734,7 @@
         </p:sp>
         <p:sp>
           <p:nvSpPr>
-            <p:cNvPr id="22" name="tx22"/>
+            <p:cNvPr id="21" name="tx21"/>
             <p:cNvSpPr/>
             <p:nvPr/>
           </p:nvSpPr>
@@ -2806,14 +2780,14 @@
         </p:sp>
         <p:sp>
           <p:nvSpPr>
-            <p:cNvPr id="23" name="tx23"/>
-            <p:cNvSpPr/>
-            <p:nvPr/>
-          </p:nvSpPr>
-          <p:spPr>
-            <a:xfrm>
-              <a:off x="461449" y="1145105"/>
-              <a:ext cx="237212" cy="76279"/>
+            <p:cNvPr id="22" name="tx22"/>
+            <p:cNvSpPr/>
+            <p:nvPr/>
+          </p:nvSpPr>
+          <p:spPr>
+            <a:xfrm>
+              <a:off x="506653" y="1145105"/>
+              <a:ext cx="192008" cy="76279"/>
             </a:xfrm>
             <a:prstGeom prst="rect">
               <a:avLst/>
@@ -2845,14 +2819,14 @@
                   <a:latin typeface="Arial"/>
                   <a:cs typeface="Arial"/>
                 </a:rPr>
-                <a:t>(n=15)</a:t>
+                <a:t>(n=8)</a:t>
               </a:r>
             </a:p>
           </p:txBody>
         </p:sp>
         <p:sp>
           <p:nvSpPr>
-            <p:cNvPr id="24" name="tx24"/>
+            <p:cNvPr id="23" name="tx23"/>
             <p:cNvSpPr/>
             <p:nvPr/>
           </p:nvSpPr>
@@ -2898,14 +2872,14 @@
         </p:sp>
         <p:sp>
           <p:nvSpPr>
-            <p:cNvPr id="25" name="tx25"/>
-            <p:cNvSpPr/>
-            <p:nvPr/>
-          </p:nvSpPr>
-          <p:spPr>
-            <a:xfrm>
-              <a:off x="506653" y="906455"/>
-              <a:ext cx="192008" cy="76279"/>
+            <p:cNvPr id="24" name="tx24"/>
+            <p:cNvSpPr/>
+            <p:nvPr/>
+          </p:nvSpPr>
+          <p:spPr>
+            <a:xfrm>
+              <a:off x="461449" y="906455"/>
+              <a:ext cx="237212" cy="76279"/>
             </a:xfrm>
             <a:prstGeom prst="rect">
               <a:avLst/>
@@ -2937,14 +2911,14 @@
                   <a:latin typeface="Arial"/>
                   <a:cs typeface="Arial"/>
                 </a:rPr>
-                <a:t>(n=2)</a:t>
+                <a:t>(n=24)</a:t>
               </a:r>
             </a:p>
           </p:txBody>
         </p:sp>
         <p:sp>
           <p:nvSpPr>
-            <p:cNvPr id="26" name="tx26"/>
+            <p:cNvPr id="25" name="tx25"/>
             <p:cNvSpPr/>
             <p:nvPr/>
           </p:nvSpPr>
@@ -2990,7 +2964,7 @@
         </p:sp>
         <p:sp>
           <p:nvSpPr>
-            <p:cNvPr id="27" name="tx27"/>
+            <p:cNvPr id="26" name="tx26"/>
             <p:cNvSpPr/>
             <p:nvPr/>
           </p:nvSpPr>
@@ -3029,14 +3003,14 @@
                   <a:latin typeface="Arial"/>
                   <a:cs typeface="Arial"/>
                 </a:rPr>
-                <a:t>(n=70)</a:t>
+                <a:t>(n=68)</a:t>
               </a:r>
             </a:p>
           </p:txBody>
         </p:sp>
         <p:sp>
           <p:nvSpPr>
-            <p:cNvPr id="28" name="tx28"/>
+            <p:cNvPr id="27" name="tx27"/>
             <p:cNvSpPr/>
             <p:nvPr/>
           </p:nvSpPr>
@@ -3082,7 +3056,7 @@
         </p:sp>
         <p:sp>
           <p:nvSpPr>
-            <p:cNvPr id="29" name="tx29"/>
+            <p:cNvPr id="28" name="tx28"/>
             <p:cNvSpPr/>
             <p:nvPr/>
           </p:nvSpPr>
@@ -3121,14 +3095,14 @@
                   <a:latin typeface="Arial"/>
                   <a:cs typeface="Arial"/>
                 </a:rPr>
-                <a:t>(n=223)</a:t>
+                <a:t>(n=278)</a:t>
               </a:r>
             </a:p>
           </p:txBody>
         </p:sp>
         <p:sp>
           <p:nvSpPr>
-            <p:cNvPr id="30" name="tx30"/>
+            <p:cNvPr id="29" name="tx29"/>
             <p:cNvSpPr/>
             <p:nvPr/>
           </p:nvSpPr>
@@ -3174,7 +3148,7 @@
         </p:sp>
         <p:sp>
           <p:nvSpPr>
-            <p:cNvPr id="31" name="tx31"/>
+            <p:cNvPr id="30" name="tx30"/>
             <p:cNvSpPr/>
             <p:nvPr/>
           </p:nvSpPr>
@@ -3213,14 +3187,14 @@
                   <a:latin typeface="Arial"/>
                   <a:cs typeface="Arial"/>
                 </a:rPr>
-                <a:t>(n=259)</a:t>
+                <a:t>(n=346)</a:t>
               </a:r>
             </a:p>
           </p:txBody>
         </p:sp>
         <p:sp>
           <p:nvSpPr>
-            <p:cNvPr id="32" name="pl32"/>
+            <p:cNvPr id="31" name="pl31"/>
             <p:cNvSpPr/>
             <p:nvPr/>
           </p:nvSpPr>
@@ -3260,7 +3234,7 @@
         </p:sp>
         <p:sp>
           <p:nvSpPr>
-            <p:cNvPr id="33" name="pl33"/>
+            <p:cNvPr id="32" name="pl32"/>
             <p:cNvSpPr/>
             <p:nvPr/>
           </p:nvSpPr>
@@ -3300,7 +3274,7 @@
         </p:sp>
         <p:sp>
           <p:nvSpPr>
-            <p:cNvPr id="34" name="pl34"/>
+            <p:cNvPr id="33" name="pl33"/>
             <p:cNvSpPr/>
             <p:nvPr/>
           </p:nvSpPr>
@@ -3340,7 +3314,7 @@
         </p:sp>
         <p:sp>
           <p:nvSpPr>
-            <p:cNvPr id="35" name="pl35"/>
+            <p:cNvPr id="34" name="pl34"/>
             <p:cNvSpPr/>
             <p:nvPr/>
           </p:nvSpPr>
@@ -3380,7 +3354,7 @@
         </p:sp>
         <p:sp>
           <p:nvSpPr>
-            <p:cNvPr id="36" name="pl36"/>
+            <p:cNvPr id="35" name="pl35"/>
             <p:cNvSpPr/>
             <p:nvPr/>
           </p:nvSpPr>
@@ -3420,7 +3394,7 @@
         </p:sp>
         <p:sp>
           <p:nvSpPr>
-            <p:cNvPr id="37" name="pl37"/>
+            <p:cNvPr id="36" name="pl36"/>
             <p:cNvSpPr/>
             <p:nvPr/>
           </p:nvSpPr>
@@ -3460,7 +3434,7 @@
         </p:sp>
         <p:sp>
           <p:nvSpPr>
-            <p:cNvPr id="38" name="pl38"/>
+            <p:cNvPr id="37" name="pl37"/>
             <p:cNvSpPr/>
             <p:nvPr/>
           </p:nvSpPr>
@@ -3500,7 +3474,7 @@
         </p:sp>
         <p:sp>
           <p:nvSpPr>
-            <p:cNvPr id="39" name="pl39"/>
+            <p:cNvPr id="38" name="pl38"/>
             <p:cNvSpPr/>
             <p:nvPr/>
           </p:nvSpPr>
@@ -3540,7 +3514,7 @@
         </p:sp>
         <p:sp>
           <p:nvSpPr>
-            <p:cNvPr id="40" name="pl40"/>
+            <p:cNvPr id="39" name="pl39"/>
             <p:cNvSpPr/>
             <p:nvPr/>
           </p:nvSpPr>
@@ -3580,7 +3554,7 @@
         </p:sp>
         <p:sp>
           <p:nvSpPr>
-            <p:cNvPr id="41" name="pl41"/>
+            <p:cNvPr id="40" name="pl40"/>
             <p:cNvSpPr/>
             <p:nvPr/>
           </p:nvSpPr>
@@ -3620,7 +3594,7 @@
         </p:sp>
         <p:sp>
           <p:nvSpPr>
-            <p:cNvPr id="42" name="pl42"/>
+            <p:cNvPr id="41" name="pl41"/>
             <p:cNvSpPr/>
             <p:nvPr/>
           </p:nvSpPr>
@@ -3660,7 +3634,7 @@
         </p:sp>
         <p:sp>
           <p:nvSpPr>
-            <p:cNvPr id="43" name="tx43"/>
+            <p:cNvPr id="42" name="tx42"/>
             <p:cNvSpPr/>
             <p:nvPr/>
           </p:nvSpPr>
@@ -3706,7 +3680,7 @@
         </p:sp>
         <p:sp>
           <p:nvSpPr>
-            <p:cNvPr id="44" name="tx44"/>
+            <p:cNvPr id="43" name="tx43"/>
             <p:cNvSpPr/>
             <p:nvPr/>
           </p:nvSpPr>
@@ -3752,7 +3726,7 @@
         </p:sp>
         <p:sp>
           <p:nvSpPr>
-            <p:cNvPr id="45" name="tx45"/>
+            <p:cNvPr id="44" name="tx44"/>
             <p:cNvSpPr/>
             <p:nvPr/>
           </p:nvSpPr>
@@ -3798,7 +3772,7 @@
         </p:sp>
         <p:sp>
           <p:nvSpPr>
-            <p:cNvPr id="46" name="tx46"/>
+            <p:cNvPr id="45" name="tx45"/>
             <p:cNvSpPr/>
             <p:nvPr/>
           </p:nvSpPr>
@@ -3844,7 +3818,7 @@
         </p:sp>
         <p:sp>
           <p:nvSpPr>
-            <p:cNvPr id="47" name="tx47"/>
+            <p:cNvPr id="46" name="tx46"/>
             <p:cNvSpPr/>
             <p:nvPr/>
           </p:nvSpPr>
@@ -3890,7 +3864,7 @@
         </p:sp>
         <p:sp>
           <p:nvSpPr>
-            <p:cNvPr id="48" name="tx48"/>
+            <p:cNvPr id="47" name="tx47"/>
             <p:cNvSpPr/>
             <p:nvPr/>
           </p:nvSpPr>

</xml_diff>